<commit_message>
rephrasing the script, make it able to be submit, still wait for another model
</commit_message>
<xml_diff>
--- a/Observation_analysis.pptx
+++ b/Observation_analysis.pptx
@@ -5,17 +5,18 @@
     <p:sldMasterId id="2147483972" r:id="rId1"/>
   </p:sldMasterIdLst>
   <p:notesMasterIdLst>
-    <p:notesMasterId r:id="rId10"/>
+    <p:notesMasterId r:id="rId11"/>
   </p:notesMasterIdLst>
   <p:sldIdLst>
     <p:sldId id="260" r:id="rId2"/>
-    <p:sldId id="261" r:id="rId3"/>
-    <p:sldId id="262" r:id="rId4"/>
-    <p:sldId id="264" r:id="rId5"/>
-    <p:sldId id="263" r:id="rId6"/>
-    <p:sldId id="265" r:id="rId7"/>
-    <p:sldId id="266" r:id="rId8"/>
-    <p:sldId id="267" r:id="rId9"/>
+    <p:sldId id="268" r:id="rId3"/>
+    <p:sldId id="261" r:id="rId4"/>
+    <p:sldId id="262" r:id="rId5"/>
+    <p:sldId id="264" r:id="rId6"/>
+    <p:sldId id="263" r:id="rId7"/>
+    <p:sldId id="265" r:id="rId8"/>
+    <p:sldId id="266" r:id="rId9"/>
+    <p:sldId id="267" r:id="rId10"/>
   </p:sldIdLst>
   <p:sldSz cx="12192000" cy="6858000"/>
   <p:notesSz cx="6858000" cy="9144000"/>
@@ -216,7 +217,7 @@
           <a:p>
             <a:fld id="{DB324EC3-B7F8-40CC-A9FF-EF0CAE4C472D}" type="datetimeFigureOut">
               <a:rPr lang="en-GB" smtClean="0"/>
-              <a:t>23/03/2022</a:t>
+              <a:t>24/03/2022</a:t>
             </a:fld>
             <a:endParaRPr lang="en-GB"/>
           </a:p>
@@ -1876,7 +1877,7 @@
           <p:cNvPr id="4" name="Slide Number Placeholder 3">
             <a:extLst>
               <a:ext uri="{FF2B5EF4-FFF2-40B4-BE49-F238E27FC236}">
-                <a16:creationId xmlns:a16="http://schemas.microsoft.com/office/drawing/2014/main" id="{593194EF-35A6-4A02-9240-91457E722B62}"/>
+                <a16:creationId xmlns:a16="http://schemas.microsoft.com/office/drawing/2014/main" id="{91DA2503-2A80-4274-8FE6-822F32836EA3}"/>
               </a:ext>
             </a:extLst>
           </p:cNvPr>
@@ -1905,7 +1906,7 @@
           <p:cNvPr id="5" name="TextBox 4">
             <a:extLst>
               <a:ext uri="{FF2B5EF4-FFF2-40B4-BE49-F238E27FC236}">
-                <a16:creationId xmlns:a16="http://schemas.microsoft.com/office/drawing/2014/main" id="{57BDD4AA-D0DA-4144-B9EE-5729062A29BC}"/>
+                <a16:creationId xmlns:a16="http://schemas.microsoft.com/office/drawing/2014/main" id="{34452E46-292C-46C5-A428-111E86AA47E2}"/>
               </a:ext>
             </a:extLst>
           </p:cNvPr>
@@ -1930,61 +1931,237 @@
           <a:p>
             <a:r>
               <a:rPr lang="en-GB" dirty="0"/>
-              <a:t>1 Try divide cells based on area (by ‘</a:t>
-            </a:r>
-            <a:r>
-              <a:rPr lang="en-GB" dirty="0" err="1"/>
-              <a:t>panel_voltage</a:t>
-            </a:r>
-            <a:r>
-              <a:rPr lang="en-GB" dirty="0"/>
-              <a:t>’)</a:t>
-            </a:r>
-          </a:p>
-        </p:txBody>
-      </p:sp>
-      <p:pic>
-        <p:nvPicPr>
-          <p:cNvPr id="7" name="Picture 6" descr="A picture containing candelabrum, pencil&#10;&#10;Description automatically generated">
-            <a:extLst>
-              <a:ext uri="{FF2B5EF4-FFF2-40B4-BE49-F238E27FC236}">
-                <a16:creationId xmlns:a16="http://schemas.microsoft.com/office/drawing/2014/main" id="{D55D02F0-129E-4D3B-A42A-9008F88105E1}"/>
-              </a:ext>
-            </a:extLst>
-          </p:cNvPr>
-          <p:cNvPicPr>
-            <a:picLocks noChangeAspect="1"/>
-          </p:cNvPicPr>
+              <a:t>Main Logic</a:t>
+            </a:r>
+          </a:p>
+        </p:txBody>
+      </p:sp>
+      <p:sp>
+        <p:nvSpPr>
+          <p:cNvPr id="6" name="Rectangle: Rounded Corners 5" descr="sdsd">
+            <a:extLst>
+              <a:ext uri="{FF2B5EF4-FFF2-40B4-BE49-F238E27FC236}">
+                <a16:creationId xmlns:a16="http://schemas.microsoft.com/office/drawing/2014/main" id="{6614E7A3-779B-4EBA-BB87-28A15B668FA7}"/>
+              </a:ext>
+            </a:extLst>
+          </p:cNvPr>
+          <p:cNvSpPr/>
           <p:nvPr/>
-        </p:nvPicPr>
-        <p:blipFill>
-          <a:blip r:embed="rId2">
-            <a:extLst>
-              <a:ext uri="{28A0092B-C50C-407E-A947-70E740481C1C}">
-                <a14:useLocalDpi xmlns:a14="http://schemas.microsoft.com/office/drawing/2010/main" val="0"/>
-              </a:ext>
-            </a:extLst>
-          </a:blip>
-          <a:stretch>
-            <a:fillRect/>
-          </a:stretch>
-        </p:blipFill>
-        <p:spPr>
-          <a:xfrm>
-            <a:off x="552893" y="843412"/>
-            <a:ext cx="6732769" cy="5171176"/>
-          </a:xfrm>
-          <a:prstGeom prst="rect">
-            <a:avLst/>
-          </a:prstGeom>
-        </p:spPr>
-      </p:pic>
-      <p:sp>
-        <p:nvSpPr>
-          <p:cNvPr id="8" name="TextBox 7">
-            <a:extLst>
-              <a:ext uri="{FF2B5EF4-FFF2-40B4-BE49-F238E27FC236}">
-                <a16:creationId xmlns:a16="http://schemas.microsoft.com/office/drawing/2014/main" id="{9AC770B7-74D1-49DD-A6D8-C47AA9DBDEF8}"/>
+        </p:nvSpPr>
+        <p:spPr>
+          <a:xfrm>
+            <a:off x="1045853" y="1083108"/>
+            <a:ext cx="1512620" cy="734786"/>
+          </a:xfrm>
+          <a:prstGeom prst="roundRect">
+            <a:avLst/>
+          </a:prstGeom>
+          <a:noFill/>
+          <a:ln w="19050"/>
+        </p:spPr>
+        <p:style>
+          <a:lnRef idx="2">
+            <a:schemeClr val="accent1">
+              <a:shade val="50000"/>
+            </a:schemeClr>
+          </a:lnRef>
+          <a:fillRef idx="1">
+            <a:schemeClr val="accent1"/>
+          </a:fillRef>
+          <a:effectRef idx="0">
+            <a:schemeClr val="accent1"/>
+          </a:effectRef>
+          <a:fontRef idx="minor">
+            <a:schemeClr val="lt1"/>
+          </a:fontRef>
+        </p:style>
+        <p:txBody>
+          <a:bodyPr rtlCol="0" anchor="ctr"/>
+          <a:lstStyle/>
+          <a:p>
+            <a:pPr algn="ctr"/>
+            <a:r>
+              <a:rPr lang="en-GB" dirty="0">
+                <a:solidFill>
+                  <a:schemeClr val="tx1"/>
+                </a:solidFill>
+              </a:rPr>
+              <a:t>Data Observation</a:t>
+            </a:r>
+          </a:p>
+        </p:txBody>
+      </p:sp>
+      <p:sp>
+        <p:nvSpPr>
+          <p:cNvPr id="8" name="Rectangle: Rounded Corners 7" descr="sdsd">
+            <a:extLst>
+              <a:ext uri="{FF2B5EF4-FFF2-40B4-BE49-F238E27FC236}">
+                <a16:creationId xmlns:a16="http://schemas.microsoft.com/office/drawing/2014/main" id="{616ACA5C-F07F-408D-AE33-84DB31EE0999}"/>
+              </a:ext>
+            </a:extLst>
+          </p:cNvPr>
+          <p:cNvSpPr/>
+          <p:nvPr/>
+        </p:nvSpPr>
+        <p:spPr>
+          <a:xfrm>
+            <a:off x="5556005" y="1083109"/>
+            <a:ext cx="1512620" cy="734785"/>
+          </a:xfrm>
+          <a:prstGeom prst="roundRect">
+            <a:avLst/>
+          </a:prstGeom>
+          <a:noFill/>
+          <a:ln w="19050"/>
+        </p:spPr>
+        <p:style>
+          <a:lnRef idx="2">
+            <a:schemeClr val="accent1">
+              <a:shade val="50000"/>
+            </a:schemeClr>
+          </a:lnRef>
+          <a:fillRef idx="1">
+            <a:schemeClr val="accent1"/>
+          </a:fillRef>
+          <a:effectRef idx="0">
+            <a:schemeClr val="accent1"/>
+          </a:effectRef>
+          <a:fontRef idx="minor">
+            <a:schemeClr val="lt1"/>
+          </a:fontRef>
+        </p:style>
+        <p:txBody>
+          <a:bodyPr rtlCol="0" anchor="ctr"/>
+          <a:lstStyle/>
+          <a:p>
+            <a:pPr algn="ctr"/>
+            <a:r>
+              <a:rPr lang="en-GB" dirty="0">
+                <a:solidFill>
+                  <a:schemeClr val="tx1"/>
+                </a:solidFill>
+              </a:rPr>
+              <a:t>Baselines</a:t>
+            </a:r>
+          </a:p>
+        </p:txBody>
+      </p:sp>
+      <p:sp>
+        <p:nvSpPr>
+          <p:cNvPr id="9" name="Rectangle: Rounded Corners 8" descr="sdsd">
+            <a:extLst>
+              <a:ext uri="{FF2B5EF4-FFF2-40B4-BE49-F238E27FC236}">
+                <a16:creationId xmlns:a16="http://schemas.microsoft.com/office/drawing/2014/main" id="{054C7315-AF3B-4CF1-9E05-86D75F2A3F05}"/>
+              </a:ext>
+            </a:extLst>
+          </p:cNvPr>
+          <p:cNvSpPr/>
+          <p:nvPr/>
+        </p:nvSpPr>
+        <p:spPr>
+          <a:xfrm>
+            <a:off x="8007928" y="1083108"/>
+            <a:ext cx="1625599" cy="734785"/>
+          </a:xfrm>
+          <a:prstGeom prst="roundRect">
+            <a:avLst/>
+          </a:prstGeom>
+          <a:noFill/>
+          <a:ln w="19050"/>
+        </p:spPr>
+        <p:style>
+          <a:lnRef idx="2">
+            <a:schemeClr val="accent1">
+              <a:shade val="50000"/>
+            </a:schemeClr>
+          </a:lnRef>
+          <a:fillRef idx="1">
+            <a:schemeClr val="accent1"/>
+          </a:fillRef>
+          <a:effectRef idx="0">
+            <a:schemeClr val="accent1"/>
+          </a:effectRef>
+          <a:fontRef idx="minor">
+            <a:schemeClr val="lt1"/>
+          </a:fontRef>
+        </p:style>
+        <p:txBody>
+          <a:bodyPr rtlCol="0" anchor="ctr"/>
+          <a:lstStyle/>
+          <a:p>
+            <a:pPr algn="ctr"/>
+            <a:r>
+              <a:rPr lang="en-GB" dirty="0">
+                <a:solidFill>
+                  <a:schemeClr val="tx1"/>
+                </a:solidFill>
+              </a:rPr>
+              <a:t>Evaluation</a:t>
+            </a:r>
+          </a:p>
+        </p:txBody>
+      </p:sp>
+      <p:sp>
+        <p:nvSpPr>
+          <p:cNvPr id="10" name="Rectangle: Rounded Corners 9" descr="sdsd">
+            <a:extLst>
+              <a:ext uri="{FF2B5EF4-FFF2-40B4-BE49-F238E27FC236}">
+                <a16:creationId xmlns:a16="http://schemas.microsoft.com/office/drawing/2014/main" id="{5F85EA07-AC4D-4CD4-8FD7-C0EC698913A4}"/>
+              </a:ext>
+            </a:extLst>
+          </p:cNvPr>
+          <p:cNvSpPr/>
+          <p:nvPr/>
+        </p:nvSpPr>
+        <p:spPr>
+          <a:xfrm>
+            <a:off x="3300929" y="1083108"/>
+            <a:ext cx="1512620" cy="734786"/>
+          </a:xfrm>
+          <a:prstGeom prst="roundRect">
+            <a:avLst/>
+          </a:prstGeom>
+          <a:noFill/>
+          <a:ln w="19050"/>
+        </p:spPr>
+        <p:style>
+          <a:lnRef idx="2">
+            <a:schemeClr val="accent1">
+              <a:shade val="50000"/>
+            </a:schemeClr>
+          </a:lnRef>
+          <a:fillRef idx="1">
+            <a:schemeClr val="accent1"/>
+          </a:fillRef>
+          <a:effectRef idx="0">
+            <a:schemeClr val="accent1"/>
+          </a:effectRef>
+          <a:fontRef idx="minor">
+            <a:schemeClr val="lt1"/>
+          </a:fontRef>
+        </p:style>
+        <p:txBody>
+          <a:bodyPr rtlCol="0" anchor="ctr"/>
+          <a:lstStyle/>
+          <a:p>
+            <a:pPr algn="ctr"/>
+            <a:r>
+              <a:rPr lang="en-GB" dirty="0">
+                <a:solidFill>
+                  <a:schemeClr val="tx1"/>
+                </a:solidFill>
+              </a:rPr>
+              <a:t>Feature Engineering</a:t>
+            </a:r>
+          </a:p>
+        </p:txBody>
+      </p:sp>
+      <p:sp>
+        <p:nvSpPr>
+          <p:cNvPr id="11" name="TextBox 10">
+            <a:extLst>
+              <a:ext uri="{FF2B5EF4-FFF2-40B4-BE49-F238E27FC236}">
+                <a16:creationId xmlns:a16="http://schemas.microsoft.com/office/drawing/2014/main" id="{C1A21596-8B76-4984-99EC-963293B288C8}"/>
               </a:ext>
             </a:extLst>
           </p:cNvPr>
@@ -1993,8 +2170,8 @@
         </p:nvSpPr>
         <p:spPr>
           <a:xfrm>
-            <a:off x="7531015" y="2400300"/>
-            <a:ext cx="4049425" cy="1477328"/>
+            <a:off x="1045853" y="2447636"/>
+            <a:ext cx="1512620" cy="378691"/>
           </a:xfrm>
           <a:prstGeom prst="rect">
             <a:avLst/>
@@ -2007,26 +2184,10 @@
           </a:bodyPr>
           <a:lstStyle/>
           <a:p>
-            <a:r>
-              <a:rPr lang="en-GB" dirty="0"/>
-              <a:t>All cells seems share same time for sunny weather which indicate their </a:t>
-            </a:r>
-            <a:r>
-              <a:rPr lang="en-GB" b="1" dirty="0">
-                <a:solidFill>
-                  <a:srgbClr val="FF0000"/>
-                </a:solidFill>
-              </a:rPr>
-              <a:t>locations are relatively same</a:t>
-            </a:r>
-          </a:p>
-          <a:p>
-            <a:endParaRPr lang="en-GB" dirty="0"/>
-          </a:p>
-          <a:p>
-            <a:r>
-              <a:rPr lang="en-GB" dirty="0"/>
-              <a:t>Abnormal cell index: 153 (range from 0)</a:t>
+            <a:pPr algn="ctr"/>
+            <a:r>
+              <a:rPr lang="en-GB" dirty="0"/>
+              <a:t>T-SNE</a:t>
             </a:r>
           </a:p>
         </p:txBody>
@@ -2034,7 +2195,7 @@
     </p:spTree>
     <p:extLst>
       <p:ext uri="{BB962C8B-B14F-4D97-AF65-F5344CB8AC3E}">
-        <p14:creationId xmlns:p14="http://schemas.microsoft.com/office/powerpoint/2010/main" val="70147540"/>
+        <p14:creationId xmlns:p14="http://schemas.microsoft.com/office/powerpoint/2010/main" val="2926295074"/>
       </p:ext>
     </p:extLst>
   </p:cSld>
@@ -2066,7 +2227,7 @@
           <p:cNvPr id="4" name="Slide Number Placeholder 3">
             <a:extLst>
               <a:ext uri="{FF2B5EF4-FFF2-40B4-BE49-F238E27FC236}">
-                <a16:creationId xmlns:a16="http://schemas.microsoft.com/office/drawing/2014/main" id="{7FC8E056-9638-46C8-9500-E8FD627C074E}"/>
+                <a16:creationId xmlns:a16="http://schemas.microsoft.com/office/drawing/2014/main" id="{593194EF-35A6-4A02-9240-91457E722B62}"/>
               </a:ext>
             </a:extLst>
           </p:cNvPr>
@@ -2095,7 +2256,7 @@
           <p:cNvPr id="5" name="TextBox 4">
             <a:extLst>
               <a:ext uri="{FF2B5EF4-FFF2-40B4-BE49-F238E27FC236}">
-                <a16:creationId xmlns:a16="http://schemas.microsoft.com/office/drawing/2014/main" id="{92BA32D0-04D5-429B-9C4F-31096BA5D63A}"/>
+                <a16:creationId xmlns:a16="http://schemas.microsoft.com/office/drawing/2014/main" id="{57BDD4AA-D0DA-4144-B9EE-5729062A29BC}"/>
               </a:ext>
             </a:extLst>
           </p:cNvPr>
@@ -2120,11 +2281,11 @@
           <a:p>
             <a:r>
               <a:rPr lang="en-GB" dirty="0"/>
-              <a:t>2.1.1 Try divide cells based on outer usage 1 (by ‘</a:t>
+              <a:t>1 Try divide cells based on area (by ‘</a:t>
             </a:r>
             <a:r>
               <a:rPr lang="en-GB" dirty="0" err="1"/>
-              <a:t>usb_current</a:t>
+              <a:t>panel_voltage</a:t>
             </a:r>
             <a:r>
               <a:rPr lang="en-GB" dirty="0"/>
@@ -2135,10 +2296,10 @@
       </p:sp>
       <p:pic>
         <p:nvPicPr>
-          <p:cNvPr id="6" name="Picture 5">
-            <a:extLst>
-              <a:ext uri="{FF2B5EF4-FFF2-40B4-BE49-F238E27FC236}">
-                <a16:creationId xmlns:a16="http://schemas.microsoft.com/office/drawing/2014/main" id="{8C69EA31-8799-4340-A842-2C752487A779}"/>
+          <p:cNvPr id="7" name="Picture 6" descr="A picture containing candelabrum, pencil&#10;&#10;Description automatically generated">
+            <a:extLst>
+              <a:ext uri="{FF2B5EF4-FFF2-40B4-BE49-F238E27FC236}">
+                <a16:creationId xmlns:a16="http://schemas.microsoft.com/office/drawing/2014/main" id="{D55D02F0-129E-4D3B-A42A-9008F88105E1}"/>
               </a:ext>
             </a:extLst>
           </p:cNvPr>
@@ -2148,37 +2309,7 @@
           <p:nvPr/>
         </p:nvPicPr>
         <p:blipFill>
-          <a:blip r:embed="rId2"/>
-          <a:stretch>
-            <a:fillRect/>
-          </a:stretch>
-        </p:blipFill>
-        <p:spPr>
-          <a:xfrm>
-            <a:off x="8591550" y="989919"/>
-            <a:ext cx="2190750" cy="371475"/>
-          </a:xfrm>
-          <a:prstGeom prst="rect">
-            <a:avLst/>
-          </a:prstGeom>
-        </p:spPr>
-      </p:pic>
-      <p:pic>
-        <p:nvPicPr>
-          <p:cNvPr id="8" name="Picture 7" descr="Diagram&#10;&#10;Description automatically generated">
-            <a:extLst>
-              <a:ext uri="{FF2B5EF4-FFF2-40B4-BE49-F238E27FC236}">
-                <a16:creationId xmlns:a16="http://schemas.microsoft.com/office/drawing/2014/main" id="{427FBA4E-3D96-4595-81B7-BA24B3C3C415}"/>
-              </a:ext>
-            </a:extLst>
-          </p:cNvPr>
-          <p:cNvPicPr>
-            <a:picLocks noChangeAspect="1"/>
-          </p:cNvPicPr>
-          <p:nvPr/>
-        </p:nvPicPr>
-        <p:blipFill>
-          <a:blip r:embed="rId3">
+          <a:blip r:embed="rId2">
             <a:extLst>
               <a:ext uri="{28A0092B-C50C-407E-A947-70E740481C1C}">
                 <a14:useLocalDpi xmlns:a14="http://schemas.microsoft.com/office/drawing/2010/main" val="0"/>
@@ -2191,8 +2322,8 @@
         </p:blipFill>
         <p:spPr>
           <a:xfrm>
-            <a:off x="424542" y="742803"/>
-            <a:ext cx="6787944" cy="5233453"/>
+            <a:off x="552893" y="843412"/>
+            <a:ext cx="6732769" cy="5171176"/>
           </a:xfrm>
           <a:prstGeom prst="rect">
             <a:avLst/>
@@ -2201,10 +2332,10 @@
       </p:pic>
       <p:sp>
         <p:nvSpPr>
-          <p:cNvPr id="9" name="TextBox 8">
-            <a:extLst>
-              <a:ext uri="{FF2B5EF4-FFF2-40B4-BE49-F238E27FC236}">
-                <a16:creationId xmlns:a16="http://schemas.microsoft.com/office/drawing/2014/main" id="{5FF83B07-E478-4C53-923D-CC336F41787D}"/>
+          <p:cNvPr id="8" name="TextBox 7">
+            <a:extLst>
+              <a:ext uri="{FF2B5EF4-FFF2-40B4-BE49-F238E27FC236}">
+                <a16:creationId xmlns:a16="http://schemas.microsoft.com/office/drawing/2014/main" id="{9AC770B7-74D1-49DD-A6D8-C47AA9DBDEF8}"/>
               </a:ext>
             </a:extLst>
           </p:cNvPr>
@@ -2213,8 +2344,8 @@
         </p:nvSpPr>
         <p:spPr>
           <a:xfrm>
-            <a:off x="8009164" y="1583872"/>
-            <a:ext cx="3467923" cy="646331"/>
+            <a:off x="7531015" y="2400300"/>
+            <a:ext cx="4049425" cy="1477328"/>
           </a:xfrm>
           <a:prstGeom prst="rect">
             <a:avLst/>
@@ -2229,7 +2360,7 @@
           <a:p>
             <a:r>
               <a:rPr lang="en-GB" dirty="0"/>
-              <a:t>For this specific day, usage pattern </a:t>
+              <a:t>All cells seems share same time for sunny weather which indicate their </a:t>
             </a:r>
             <a:r>
               <a:rPr lang="en-GB" b="1" dirty="0">
@@ -2237,64 +2368,16 @@
                   <a:srgbClr val="FF0000"/>
                 </a:solidFill>
               </a:rPr>
-              <a:t>differences locate on time domain</a:t>
-            </a:r>
-          </a:p>
-        </p:txBody>
-      </p:sp>
-      <p:sp>
-        <p:nvSpPr>
-          <p:cNvPr id="10" name="TextBox 9">
-            <a:extLst>
-              <a:ext uri="{FF2B5EF4-FFF2-40B4-BE49-F238E27FC236}">
-                <a16:creationId xmlns:a16="http://schemas.microsoft.com/office/drawing/2014/main" id="{79794A08-8102-461C-8B1D-06E4DB213A31}"/>
-              </a:ext>
-            </a:extLst>
-          </p:cNvPr>
-          <p:cNvSpPr txBox="1"/>
-          <p:nvPr/>
-        </p:nvSpPr>
-        <p:spPr>
-          <a:xfrm>
-            <a:off x="8009164" y="2898321"/>
-            <a:ext cx="3467923" cy="2585323"/>
-          </a:xfrm>
-          <a:prstGeom prst="rect">
-            <a:avLst/>
-          </a:prstGeom>
-          <a:noFill/>
-        </p:spPr>
-        <p:txBody>
-          <a:bodyPr wrap="square" rtlCol="0">
-            <a:spAutoFit/>
-          </a:bodyPr>
-          <a:lstStyle/>
-          <a:p>
-            <a:pPr algn="ctr"/>
-            <a:r>
-              <a:rPr lang="en-GB" dirty="0"/>
-              <a:t>Cluster 0: heavily used in morning (5 am – 2 pm)</a:t>
-            </a:r>
-          </a:p>
-          <a:p>
-            <a:pPr algn="ctr"/>
-            <a:r>
-              <a:rPr lang="en-GB" dirty="0"/>
-              <a:t>Cluster 1: heavily used in night (5 pm – 11 pm)</a:t>
-            </a:r>
-          </a:p>
-          <a:p>
-            <a:pPr algn="ctr"/>
-            <a:r>
-              <a:rPr lang="en-GB" dirty="0"/>
-              <a:t>Cluster 2: Not Clear, many cells are used uniformly intense during the whole day</a:t>
-            </a:r>
-          </a:p>
-          <a:p>
-            <a:pPr algn="ctr"/>
-            <a:r>
-              <a:rPr lang="en-GB" dirty="0"/>
-              <a:t>Cluster 3: heavily used in daytime (9 am – 6 pm)</a:t>
+              <a:t>locations are relatively same</a:t>
+            </a:r>
+          </a:p>
+          <a:p>
+            <a:endParaRPr lang="en-GB" dirty="0"/>
+          </a:p>
+          <a:p>
+            <a:r>
+              <a:rPr lang="en-GB" dirty="0"/>
+              <a:t>Abnormal cell index: 153 (range from 0)</a:t>
             </a:r>
           </a:p>
         </p:txBody>
@@ -2302,7 +2385,7 @@
     </p:spTree>
     <p:extLst>
       <p:ext uri="{BB962C8B-B14F-4D97-AF65-F5344CB8AC3E}">
-        <p14:creationId xmlns:p14="http://schemas.microsoft.com/office/powerpoint/2010/main" val="2721503062"/>
+        <p14:creationId xmlns:p14="http://schemas.microsoft.com/office/powerpoint/2010/main" val="70147540"/>
       </p:ext>
     </p:extLst>
   </p:cSld>
@@ -2334,7 +2417,7 @@
           <p:cNvPr id="4" name="Slide Number Placeholder 3">
             <a:extLst>
               <a:ext uri="{FF2B5EF4-FFF2-40B4-BE49-F238E27FC236}">
-                <a16:creationId xmlns:a16="http://schemas.microsoft.com/office/drawing/2014/main" id="{77F0D145-122B-40A8-A38B-ED02C8F90A4E}"/>
+                <a16:creationId xmlns:a16="http://schemas.microsoft.com/office/drawing/2014/main" id="{7FC8E056-9638-46C8-9500-E8FD627C074E}"/>
               </a:ext>
             </a:extLst>
           </p:cNvPr>
@@ -2363,7 +2446,7 @@
           <p:cNvPr id="5" name="TextBox 4">
             <a:extLst>
               <a:ext uri="{FF2B5EF4-FFF2-40B4-BE49-F238E27FC236}">
-                <a16:creationId xmlns:a16="http://schemas.microsoft.com/office/drawing/2014/main" id="{8CE83FE5-7537-413A-A78D-4252496ED2A1}"/>
+                <a16:creationId xmlns:a16="http://schemas.microsoft.com/office/drawing/2014/main" id="{92BA32D0-04D5-429B-9C4F-31096BA5D63A}"/>
               </a:ext>
             </a:extLst>
           </p:cNvPr>
@@ -2372,8 +2455,8 @@
         </p:nvSpPr>
         <p:spPr>
           <a:xfrm>
-            <a:off x="528400" y="223283"/>
-            <a:ext cx="9048307" cy="369332"/>
+            <a:off x="552893" y="223283"/>
+            <a:ext cx="7527851" cy="369332"/>
           </a:xfrm>
           <a:prstGeom prst="rect">
             <a:avLst/>
@@ -2388,7 +2471,7 @@
           <a:p>
             <a:r>
               <a:rPr lang="en-GB" dirty="0"/>
-              <a:t>2.1.2 Try divide cells based on outer usage 1 (by ‘</a:t>
+              <a:t>2.1.1 Try divide cells based on outer usage 1 (by ‘</a:t>
             </a:r>
             <a:r>
               <a:rPr lang="en-GB" dirty="0" err="1"/>
@@ -2396,17 +2479,17 @@
             </a:r>
             <a:r>
               <a:rPr lang="en-GB" dirty="0"/>
-              <a:t>’) averaging in 1 hour level</a:t>
+              <a:t>’)</a:t>
             </a:r>
           </a:p>
         </p:txBody>
       </p:sp>
       <p:pic>
         <p:nvPicPr>
-          <p:cNvPr id="7" name="Picture 6" descr="A picture containing calendar&#10;&#10;Description automatically generated">
-            <a:extLst>
-              <a:ext uri="{FF2B5EF4-FFF2-40B4-BE49-F238E27FC236}">
-                <a16:creationId xmlns:a16="http://schemas.microsoft.com/office/drawing/2014/main" id="{9706EBD9-CB64-4924-BB78-63BC03E86415}"/>
+          <p:cNvPr id="6" name="Picture 5">
+            <a:extLst>
+              <a:ext uri="{FF2B5EF4-FFF2-40B4-BE49-F238E27FC236}">
+                <a16:creationId xmlns:a16="http://schemas.microsoft.com/office/drawing/2014/main" id="{8C69EA31-8799-4340-A842-2C752487A779}"/>
               </a:ext>
             </a:extLst>
           </p:cNvPr>
@@ -2416,7 +2499,37 @@
           <p:nvPr/>
         </p:nvPicPr>
         <p:blipFill>
-          <a:blip r:embed="rId2">
+          <a:blip r:embed="rId2"/>
+          <a:stretch>
+            <a:fillRect/>
+          </a:stretch>
+        </p:blipFill>
+        <p:spPr>
+          <a:xfrm>
+            <a:off x="8591550" y="989919"/>
+            <a:ext cx="2190750" cy="371475"/>
+          </a:xfrm>
+          <a:prstGeom prst="rect">
+            <a:avLst/>
+          </a:prstGeom>
+        </p:spPr>
+      </p:pic>
+      <p:pic>
+        <p:nvPicPr>
+          <p:cNvPr id="8" name="Picture 7" descr="Diagram&#10;&#10;Description automatically generated">
+            <a:extLst>
+              <a:ext uri="{FF2B5EF4-FFF2-40B4-BE49-F238E27FC236}">
+                <a16:creationId xmlns:a16="http://schemas.microsoft.com/office/drawing/2014/main" id="{427FBA4E-3D96-4595-81B7-BA24B3C3C415}"/>
+              </a:ext>
+            </a:extLst>
+          </p:cNvPr>
+          <p:cNvPicPr>
+            <a:picLocks noChangeAspect="1"/>
+          </p:cNvPicPr>
+          <p:nvPr/>
+        </p:nvPicPr>
+        <p:blipFill>
+          <a:blip r:embed="rId3">
             <a:extLst>
               <a:ext uri="{28A0092B-C50C-407E-A947-70E740481C1C}">
                 <a14:useLocalDpi xmlns:a14="http://schemas.microsoft.com/office/drawing/2010/main" val="0"/>
@@ -2429,8 +2542,8 @@
         </p:blipFill>
         <p:spPr>
           <a:xfrm>
-            <a:off x="528400" y="774559"/>
-            <a:ext cx="6407172" cy="4973098"/>
+            <a:off x="424542" y="742803"/>
+            <a:ext cx="6787944" cy="5233453"/>
           </a:xfrm>
           <a:prstGeom prst="rect">
             <a:avLst/>
@@ -2439,10 +2552,10 @@
       </p:pic>
       <p:sp>
         <p:nvSpPr>
-          <p:cNvPr id="8" name="TextBox 7">
-            <a:extLst>
-              <a:ext uri="{FF2B5EF4-FFF2-40B4-BE49-F238E27FC236}">
-                <a16:creationId xmlns:a16="http://schemas.microsoft.com/office/drawing/2014/main" id="{65DA2A4E-57BC-44F2-B1ED-58C85A4C1EED}"/>
+          <p:cNvPr id="9" name="TextBox 8">
+            <a:extLst>
+              <a:ext uri="{FF2B5EF4-FFF2-40B4-BE49-F238E27FC236}">
+                <a16:creationId xmlns:a16="http://schemas.microsoft.com/office/drawing/2014/main" id="{5FF83B07-E478-4C53-923D-CC336F41787D}"/>
               </a:ext>
             </a:extLst>
           </p:cNvPr>
@@ -2451,8 +2564,8 @@
         </p:nvSpPr>
         <p:spPr>
           <a:xfrm>
-            <a:off x="7462157" y="1836964"/>
-            <a:ext cx="3575957" cy="646331"/>
+            <a:off x="8009164" y="1583872"/>
+            <a:ext cx="3467923" cy="646331"/>
           </a:xfrm>
           <a:prstGeom prst="rect">
             <a:avLst/>
@@ -2465,10 +2578,74 @@
           </a:bodyPr>
           <a:lstStyle/>
           <a:p>
+            <a:r>
+              <a:rPr lang="en-GB" dirty="0"/>
+              <a:t>For this specific day, usage pattern </a:t>
+            </a:r>
+            <a:r>
+              <a:rPr lang="en-GB" b="1" dirty="0">
+                <a:solidFill>
+                  <a:srgbClr val="FF0000"/>
+                </a:solidFill>
+              </a:rPr>
+              <a:t>differences locate on time domain</a:t>
+            </a:r>
+          </a:p>
+        </p:txBody>
+      </p:sp>
+      <p:sp>
+        <p:nvSpPr>
+          <p:cNvPr id="10" name="TextBox 9">
+            <a:extLst>
+              <a:ext uri="{FF2B5EF4-FFF2-40B4-BE49-F238E27FC236}">
+                <a16:creationId xmlns:a16="http://schemas.microsoft.com/office/drawing/2014/main" id="{79794A08-8102-461C-8B1D-06E4DB213A31}"/>
+              </a:ext>
+            </a:extLst>
+          </p:cNvPr>
+          <p:cNvSpPr txBox="1"/>
+          <p:nvPr/>
+        </p:nvSpPr>
+        <p:spPr>
+          <a:xfrm>
+            <a:off x="8009164" y="2898321"/>
+            <a:ext cx="3467923" cy="2585323"/>
+          </a:xfrm>
+          <a:prstGeom prst="rect">
+            <a:avLst/>
+          </a:prstGeom>
+          <a:noFill/>
+        </p:spPr>
+        <p:txBody>
+          <a:bodyPr wrap="square" rtlCol="0">
+            <a:spAutoFit/>
+          </a:bodyPr>
+          <a:lstStyle/>
+          <a:p>
             <a:pPr algn="ctr"/>
             <a:r>
               <a:rPr lang="en-GB" dirty="0"/>
-              <a:t>Also the mentioned usage differences in time are more clear </a:t>
+              <a:t>Cluster 0: heavily used in morning (5 am – 2 pm)</a:t>
+            </a:r>
+          </a:p>
+          <a:p>
+            <a:pPr algn="ctr"/>
+            <a:r>
+              <a:rPr lang="en-GB" dirty="0"/>
+              <a:t>Cluster 1: heavily used in night (5 pm – 11 pm)</a:t>
+            </a:r>
+          </a:p>
+          <a:p>
+            <a:pPr algn="ctr"/>
+            <a:r>
+              <a:rPr lang="en-GB" dirty="0"/>
+              <a:t>Cluster 2: Not Clear, many cells are used uniformly intense during the whole day</a:t>
+            </a:r>
+          </a:p>
+          <a:p>
+            <a:pPr algn="ctr"/>
+            <a:r>
+              <a:rPr lang="en-GB" dirty="0"/>
+              <a:t>Cluster 3: heavily used in daytime (9 am – 6 pm)</a:t>
             </a:r>
           </a:p>
         </p:txBody>
@@ -2476,7 +2653,7 @@
     </p:spTree>
     <p:extLst>
       <p:ext uri="{BB962C8B-B14F-4D97-AF65-F5344CB8AC3E}">
-        <p14:creationId xmlns:p14="http://schemas.microsoft.com/office/powerpoint/2010/main" val="2347542431"/>
+        <p14:creationId xmlns:p14="http://schemas.microsoft.com/office/powerpoint/2010/main" val="2721503062"/>
       </p:ext>
     </p:extLst>
   </p:cSld>
@@ -2508,7 +2685,7 @@
           <p:cNvPr id="4" name="Slide Number Placeholder 3">
             <a:extLst>
               <a:ext uri="{FF2B5EF4-FFF2-40B4-BE49-F238E27FC236}">
-                <a16:creationId xmlns:a16="http://schemas.microsoft.com/office/drawing/2014/main" id="{A7129A49-F5B3-4F2E-B821-D62122B1C8A6}"/>
+                <a16:creationId xmlns:a16="http://schemas.microsoft.com/office/drawing/2014/main" id="{77F0D145-122B-40A8-A38B-ED02C8F90A4E}"/>
               </a:ext>
             </a:extLst>
           </p:cNvPr>
@@ -2537,7 +2714,7 @@
           <p:cNvPr id="5" name="TextBox 4">
             <a:extLst>
               <a:ext uri="{FF2B5EF4-FFF2-40B4-BE49-F238E27FC236}">
-                <a16:creationId xmlns:a16="http://schemas.microsoft.com/office/drawing/2014/main" id="{87EC6F90-6366-4A20-A5B1-EC7D2ED17C5C}"/>
+                <a16:creationId xmlns:a16="http://schemas.microsoft.com/office/drawing/2014/main" id="{8CE83FE5-7537-413A-A78D-4252496ED2A1}"/>
               </a:ext>
             </a:extLst>
           </p:cNvPr>
@@ -2546,8 +2723,8 @@
         </p:nvSpPr>
         <p:spPr>
           <a:xfrm>
-            <a:off x="552893" y="223283"/>
-            <a:ext cx="7527851" cy="369332"/>
+            <a:off x="528400" y="223283"/>
+            <a:ext cx="9048307" cy="369332"/>
           </a:xfrm>
           <a:prstGeom prst="rect">
             <a:avLst/>
@@ -2562,15 +2739,7 @@
           <a:p>
             <a:r>
               <a:rPr lang="en-GB" dirty="0"/>
-              <a:t>2.2.1 Try divide cells based on outer usage 2 (by ‘</a:t>
-            </a:r>
-            <a:r>
-              <a:rPr lang="en-GB" dirty="0" err="1"/>
-              <a:t>current_out</a:t>
-            </a:r>
-            <a:r>
-              <a:rPr lang="en-GB" dirty="0"/>
-              <a:t>’ – ‘</a:t>
+              <a:t>2.1.2 Try divide cells based on outer usage 1 (by ‘</a:t>
             </a:r>
             <a:r>
               <a:rPr lang="en-GB" dirty="0" err="1"/>
@@ -2578,17 +2747,17 @@
             </a:r>
             <a:r>
               <a:rPr lang="en-GB" dirty="0"/>
-              <a:t>’)</a:t>
+              <a:t>’) averaging in 1 hour level</a:t>
             </a:r>
           </a:p>
         </p:txBody>
       </p:sp>
       <p:pic>
         <p:nvPicPr>
-          <p:cNvPr id="7" name="Picture 6" descr="A picture containing text, shelf, indoor, lots&#10;&#10;Description automatically generated">
-            <a:extLst>
-              <a:ext uri="{FF2B5EF4-FFF2-40B4-BE49-F238E27FC236}">
-                <a16:creationId xmlns:a16="http://schemas.microsoft.com/office/drawing/2014/main" id="{73A2112D-4DC1-474D-8FD9-6ECDF9274937}"/>
+          <p:cNvPr id="7" name="Picture 6" descr="A picture containing calendar&#10;&#10;Description automatically generated">
+            <a:extLst>
+              <a:ext uri="{FF2B5EF4-FFF2-40B4-BE49-F238E27FC236}">
+                <a16:creationId xmlns:a16="http://schemas.microsoft.com/office/drawing/2014/main" id="{9706EBD9-CB64-4924-BB78-63BC03E86415}"/>
               </a:ext>
             </a:extLst>
           </p:cNvPr>
@@ -2611,8 +2780,8 @@
         </p:blipFill>
         <p:spPr>
           <a:xfrm>
-            <a:off x="552893" y="733332"/>
-            <a:ext cx="6946015" cy="5391336"/>
+            <a:off x="528400" y="774559"/>
+            <a:ext cx="6407172" cy="4973098"/>
           </a:xfrm>
           <a:prstGeom prst="rect">
             <a:avLst/>
@@ -2624,7 +2793,7 @@
           <p:cNvPr id="8" name="TextBox 7">
             <a:extLst>
               <a:ext uri="{FF2B5EF4-FFF2-40B4-BE49-F238E27FC236}">
-                <a16:creationId xmlns:a16="http://schemas.microsoft.com/office/drawing/2014/main" id="{E7099FC1-9569-4630-91D8-7EA229C3D30C}"/>
+                <a16:creationId xmlns:a16="http://schemas.microsoft.com/office/drawing/2014/main" id="{65DA2A4E-57BC-44F2-B1ED-58C85A4C1EED}"/>
               </a:ext>
             </a:extLst>
           </p:cNvPr>
@@ -2633,8 +2802,8 @@
         </p:nvSpPr>
         <p:spPr>
           <a:xfrm>
-            <a:off x="8108495" y="1514675"/>
-            <a:ext cx="3912817" cy="923330"/>
+            <a:off x="7462157" y="1836964"/>
+            <a:ext cx="3575957" cy="646331"/>
           </a:xfrm>
           <a:prstGeom prst="rect">
             <a:avLst/>
@@ -2647,214 +2816,10 @@
           </a:bodyPr>
           <a:lstStyle/>
           <a:p>
-            <a:r>
-              <a:rPr lang="en-GB" dirty="0"/>
-              <a:t>Clearly 4 different usage patterns but not</a:t>
-            </a:r>
-            <a:r>
-              <a:rPr lang="zh-CN" altLang="en-US"/>
-              <a:t> </a:t>
-            </a:r>
-            <a:r>
-              <a:rPr lang="en-GB"/>
-              <a:t>in </a:t>
-            </a:r>
-            <a:r>
-              <a:rPr lang="en-GB" dirty="0"/>
-              <a:t>time level, maybe </a:t>
-            </a:r>
-            <a:r>
-              <a:rPr lang="en-GB" b="1" dirty="0">
-                <a:solidFill>
-                  <a:srgbClr val="FF0000"/>
-                </a:solidFill>
-              </a:rPr>
-              <a:t>in equipment level</a:t>
-            </a:r>
-          </a:p>
-        </p:txBody>
-      </p:sp>
-      <p:pic>
-        <p:nvPicPr>
-          <p:cNvPr id="10" name="Picture 9">
-            <a:extLst>
-              <a:ext uri="{FF2B5EF4-FFF2-40B4-BE49-F238E27FC236}">
-                <a16:creationId xmlns:a16="http://schemas.microsoft.com/office/drawing/2014/main" id="{2326F4D7-5E58-4CFD-8C3E-92FBFB378FEA}"/>
-              </a:ext>
-            </a:extLst>
-          </p:cNvPr>
-          <p:cNvPicPr>
-            <a:picLocks noChangeAspect="1"/>
-          </p:cNvPicPr>
-          <p:nvPr/>
-        </p:nvPicPr>
-        <p:blipFill>
-          <a:blip r:embed="rId3"/>
-          <a:stretch>
-            <a:fillRect/>
-          </a:stretch>
-        </p:blipFill>
-        <p:spPr>
-          <a:xfrm>
-            <a:off x="8598710" y="855124"/>
-            <a:ext cx="2447925" cy="409575"/>
-          </a:xfrm>
-          <a:prstGeom prst="rect">
-            <a:avLst/>
-          </a:prstGeom>
-        </p:spPr>
-      </p:pic>
-      <p:sp>
-        <p:nvSpPr>
-          <p:cNvPr id="11" name="TextBox 10">
-            <a:extLst>
-              <a:ext uri="{FF2B5EF4-FFF2-40B4-BE49-F238E27FC236}">
-                <a16:creationId xmlns:a16="http://schemas.microsoft.com/office/drawing/2014/main" id="{F1C20E84-9A66-42D6-BFA1-F2CEE2876B8C}"/>
-              </a:ext>
-            </a:extLst>
-          </p:cNvPr>
-          <p:cNvSpPr txBox="1"/>
-          <p:nvPr/>
-        </p:nvSpPr>
-        <p:spPr>
-          <a:xfrm>
-            <a:off x="7624035" y="2410982"/>
-            <a:ext cx="4397277" cy="1200329"/>
-          </a:xfrm>
-          <a:prstGeom prst="rect">
-            <a:avLst/>
-          </a:prstGeom>
-          <a:noFill/>
-        </p:spPr>
-        <p:txBody>
-          <a:bodyPr wrap="square" rtlCol="0">
-            <a:spAutoFit/>
-          </a:bodyPr>
-          <a:lstStyle/>
-          <a:p>
             <a:pPr algn="ctr"/>
             <a:r>
               <a:rPr lang="en-GB" dirty="0"/>
-              <a:t>For cluster 0 &amp; 1</a:t>
-            </a:r>
-          </a:p>
-          <a:p>
-            <a:pPr marL="285750" indent="-285750" algn="ctr">
-              <a:buFont typeface="Arial" panose="020B0604020202020204" pitchFamily="34" charset="0"/>
-              <a:buChar char="•"/>
-            </a:pPr>
-            <a:r>
-              <a:rPr lang="en-GB" dirty="0"/>
-              <a:t>The platforms differences at </a:t>
-            </a:r>
-          </a:p>
-          <a:p>
-            <a:pPr algn="ctr"/>
-            <a:r>
-              <a:rPr lang="en-GB" dirty="0"/>
-              <a:t>0.4A (cluster 0 )</a:t>
-            </a:r>
-          </a:p>
-          <a:p>
-            <a:pPr algn="ctr"/>
-            <a:r>
-              <a:rPr lang="en-GB" dirty="0"/>
-              <a:t>0.2A(cluster 1)</a:t>
-            </a:r>
-          </a:p>
-        </p:txBody>
-      </p:sp>
-      <p:sp>
-        <p:nvSpPr>
-          <p:cNvPr id="12" name="TextBox 11">
-            <a:extLst>
-              <a:ext uri="{FF2B5EF4-FFF2-40B4-BE49-F238E27FC236}">
-                <a16:creationId xmlns:a16="http://schemas.microsoft.com/office/drawing/2014/main" id="{E92A5FD4-0BE2-488D-B307-7C401D6F47A8}"/>
-              </a:ext>
-            </a:extLst>
-          </p:cNvPr>
-          <p:cNvSpPr txBox="1"/>
-          <p:nvPr/>
-        </p:nvSpPr>
-        <p:spPr>
-          <a:xfrm>
-            <a:off x="7624035" y="3875666"/>
-            <a:ext cx="4397277" cy="646331"/>
-          </a:xfrm>
-          <a:prstGeom prst="rect">
-            <a:avLst/>
-          </a:prstGeom>
-          <a:noFill/>
-        </p:spPr>
-        <p:txBody>
-          <a:bodyPr wrap="square" rtlCol="0">
-            <a:spAutoFit/>
-          </a:bodyPr>
-          <a:lstStyle/>
-          <a:p>
-            <a:pPr algn="ctr"/>
-            <a:r>
-              <a:rPr lang="en-GB" dirty="0"/>
-              <a:t>cluster 2 seems have constant usage at 0.2A</a:t>
-            </a:r>
-          </a:p>
-          <a:p>
-            <a:pPr algn="ctr"/>
-            <a:endParaRPr lang="en-GB" dirty="0"/>
-          </a:p>
-        </p:txBody>
-      </p:sp>
-      <p:sp>
-        <p:nvSpPr>
-          <p:cNvPr id="13" name="TextBox 12">
-            <a:extLst>
-              <a:ext uri="{FF2B5EF4-FFF2-40B4-BE49-F238E27FC236}">
-                <a16:creationId xmlns:a16="http://schemas.microsoft.com/office/drawing/2014/main" id="{FE265653-C77E-4C8C-BCAC-21B24B5B622E}"/>
-              </a:ext>
-            </a:extLst>
-          </p:cNvPr>
-          <p:cNvSpPr txBox="1"/>
-          <p:nvPr/>
-        </p:nvSpPr>
-        <p:spPr>
-          <a:xfrm>
-            <a:off x="8186654" y="4669971"/>
-            <a:ext cx="3277362" cy="923330"/>
-          </a:xfrm>
-          <a:prstGeom prst="rect">
-            <a:avLst/>
-          </a:prstGeom>
-          <a:noFill/>
-        </p:spPr>
-        <p:txBody>
-          <a:bodyPr wrap="square" rtlCol="0">
-            <a:spAutoFit/>
-          </a:bodyPr>
-          <a:lstStyle/>
-          <a:p>
-            <a:r>
-              <a:rPr lang="en-GB" dirty="0">
-                <a:solidFill>
-                  <a:srgbClr val="FF0000"/>
-                </a:solidFill>
-              </a:rPr>
-              <a:t>Does the differences related to different energy-consumption </a:t>
-            </a:r>
-            <a:r>
-              <a:rPr lang="en-GB" dirty="0" err="1">
-                <a:solidFill>
-                  <a:srgbClr val="FF0000"/>
-                </a:solidFill>
-              </a:rPr>
-              <a:t>equipments</a:t>
-            </a:r>
-            <a:r>
-              <a:rPr lang="en-GB" dirty="0">
-                <a:solidFill>
-                  <a:srgbClr val="FF0000"/>
-                </a:solidFill>
-              </a:rPr>
-              <a:t> ?</a:t>
+              <a:t>Also the mentioned usage differences in time are more clear </a:t>
             </a:r>
           </a:p>
         </p:txBody>
@@ -2862,7 +2827,7 @@
     </p:spTree>
     <p:extLst>
       <p:ext uri="{BB962C8B-B14F-4D97-AF65-F5344CB8AC3E}">
-        <p14:creationId xmlns:p14="http://schemas.microsoft.com/office/powerpoint/2010/main" val="1328014119"/>
+        <p14:creationId xmlns:p14="http://schemas.microsoft.com/office/powerpoint/2010/main" val="2347542431"/>
       </p:ext>
     </p:extLst>
   </p:cSld>
@@ -2894,7 +2859,7 @@
           <p:cNvPr id="4" name="Slide Number Placeholder 3">
             <a:extLst>
               <a:ext uri="{FF2B5EF4-FFF2-40B4-BE49-F238E27FC236}">
-                <a16:creationId xmlns:a16="http://schemas.microsoft.com/office/drawing/2014/main" id="{CFBFDB31-5664-43AA-8B1D-27A457ED212B}"/>
+                <a16:creationId xmlns:a16="http://schemas.microsoft.com/office/drawing/2014/main" id="{A7129A49-F5B3-4F2E-B821-D62122B1C8A6}"/>
               </a:ext>
             </a:extLst>
           </p:cNvPr>
@@ -2923,7 +2888,7 @@
           <p:cNvPr id="5" name="TextBox 4">
             <a:extLst>
               <a:ext uri="{FF2B5EF4-FFF2-40B4-BE49-F238E27FC236}">
-                <a16:creationId xmlns:a16="http://schemas.microsoft.com/office/drawing/2014/main" id="{74745BFC-3B3D-4796-B8F8-686B6526F551}"/>
+                <a16:creationId xmlns:a16="http://schemas.microsoft.com/office/drawing/2014/main" id="{87EC6F90-6366-4A20-A5B1-EC7D2ED17C5C}"/>
               </a:ext>
             </a:extLst>
           </p:cNvPr>
@@ -2971,10 +2936,10 @@
       </p:sp>
       <p:pic>
         <p:nvPicPr>
-          <p:cNvPr id="7" name="Picture 6" descr="Diagram&#10;&#10;Description automatically generated">
-            <a:extLst>
-              <a:ext uri="{FF2B5EF4-FFF2-40B4-BE49-F238E27FC236}">
-                <a16:creationId xmlns:a16="http://schemas.microsoft.com/office/drawing/2014/main" id="{23D3F858-126A-422E-84C1-29C5C768D3D8}"/>
+          <p:cNvPr id="7" name="Picture 6" descr="A picture containing text, shelf, indoor, lots&#10;&#10;Description automatically generated">
+            <a:extLst>
+              <a:ext uri="{FF2B5EF4-FFF2-40B4-BE49-F238E27FC236}">
+                <a16:creationId xmlns:a16="http://schemas.microsoft.com/office/drawing/2014/main" id="{73A2112D-4DC1-474D-8FD9-6ECDF9274937}"/>
               </a:ext>
             </a:extLst>
           </p:cNvPr>
@@ -2997,8 +2962,8 @@
         </p:blipFill>
         <p:spPr>
           <a:xfrm>
-            <a:off x="958110" y="884820"/>
-            <a:ext cx="6717415" cy="5213902"/>
+            <a:off x="552893" y="733332"/>
+            <a:ext cx="6946015" cy="5391336"/>
           </a:xfrm>
           <a:prstGeom prst="rect">
             <a:avLst/>
@@ -3010,7 +2975,7 @@
           <p:cNvPr id="8" name="TextBox 7">
             <a:extLst>
               <a:ext uri="{FF2B5EF4-FFF2-40B4-BE49-F238E27FC236}">
-                <a16:creationId xmlns:a16="http://schemas.microsoft.com/office/drawing/2014/main" id="{64C60CF7-BD50-4D5C-B7B1-DFE47C1D1E2B}"/>
+                <a16:creationId xmlns:a16="http://schemas.microsoft.com/office/drawing/2014/main" id="{E7099FC1-9569-4630-91D8-7EA229C3D30C}"/>
               </a:ext>
             </a:extLst>
           </p:cNvPr>
@@ -3019,8 +2984,8 @@
         </p:nvSpPr>
         <p:spPr>
           <a:xfrm>
-            <a:off x="7968343" y="2547256"/>
-            <a:ext cx="3575957" cy="646331"/>
+            <a:off x="8108495" y="1514675"/>
+            <a:ext cx="3912817" cy="923330"/>
           </a:xfrm>
           <a:prstGeom prst="rect">
             <a:avLst/>
@@ -3033,10 +2998,214 @@
           </a:bodyPr>
           <a:lstStyle/>
           <a:p>
+            <a:r>
+              <a:rPr lang="en-GB" dirty="0"/>
+              <a:t>Clearly 4 different usage patterns but not</a:t>
+            </a:r>
+            <a:r>
+              <a:rPr lang="zh-CN" altLang="en-US"/>
+              <a:t> </a:t>
+            </a:r>
+            <a:r>
+              <a:rPr lang="en-GB"/>
+              <a:t>in </a:t>
+            </a:r>
+            <a:r>
+              <a:rPr lang="en-GB" dirty="0"/>
+              <a:t>time level, maybe </a:t>
+            </a:r>
+            <a:r>
+              <a:rPr lang="en-GB" b="1" dirty="0">
+                <a:solidFill>
+                  <a:srgbClr val="FF0000"/>
+                </a:solidFill>
+              </a:rPr>
+              <a:t>in equipment level</a:t>
+            </a:r>
+          </a:p>
+        </p:txBody>
+      </p:sp>
+      <p:pic>
+        <p:nvPicPr>
+          <p:cNvPr id="10" name="Picture 9">
+            <a:extLst>
+              <a:ext uri="{FF2B5EF4-FFF2-40B4-BE49-F238E27FC236}">
+                <a16:creationId xmlns:a16="http://schemas.microsoft.com/office/drawing/2014/main" id="{2326F4D7-5E58-4CFD-8C3E-92FBFB378FEA}"/>
+              </a:ext>
+            </a:extLst>
+          </p:cNvPr>
+          <p:cNvPicPr>
+            <a:picLocks noChangeAspect="1"/>
+          </p:cNvPicPr>
+          <p:nvPr/>
+        </p:nvPicPr>
+        <p:blipFill>
+          <a:blip r:embed="rId3"/>
+          <a:stretch>
+            <a:fillRect/>
+          </a:stretch>
+        </p:blipFill>
+        <p:spPr>
+          <a:xfrm>
+            <a:off x="8598710" y="855124"/>
+            <a:ext cx="2447925" cy="409575"/>
+          </a:xfrm>
+          <a:prstGeom prst="rect">
+            <a:avLst/>
+          </a:prstGeom>
+        </p:spPr>
+      </p:pic>
+      <p:sp>
+        <p:nvSpPr>
+          <p:cNvPr id="11" name="TextBox 10">
+            <a:extLst>
+              <a:ext uri="{FF2B5EF4-FFF2-40B4-BE49-F238E27FC236}">
+                <a16:creationId xmlns:a16="http://schemas.microsoft.com/office/drawing/2014/main" id="{F1C20E84-9A66-42D6-BFA1-F2CEE2876B8C}"/>
+              </a:ext>
+            </a:extLst>
+          </p:cNvPr>
+          <p:cNvSpPr txBox="1"/>
+          <p:nvPr/>
+        </p:nvSpPr>
+        <p:spPr>
+          <a:xfrm>
+            <a:off x="7624035" y="2410982"/>
+            <a:ext cx="4397277" cy="1200329"/>
+          </a:xfrm>
+          <a:prstGeom prst="rect">
+            <a:avLst/>
+          </a:prstGeom>
+          <a:noFill/>
+        </p:spPr>
+        <p:txBody>
+          <a:bodyPr wrap="square" rtlCol="0">
+            <a:spAutoFit/>
+          </a:bodyPr>
+          <a:lstStyle/>
+          <a:p>
             <a:pPr algn="ctr"/>
             <a:r>
               <a:rPr lang="en-GB" dirty="0"/>
-              <a:t>Also the mentioned usage differences within one day</a:t>
+              <a:t>For cluster 0 &amp; 1</a:t>
+            </a:r>
+          </a:p>
+          <a:p>
+            <a:pPr marL="285750" indent="-285750" algn="ctr">
+              <a:buFont typeface="Arial" panose="020B0604020202020204" pitchFamily="34" charset="0"/>
+              <a:buChar char="•"/>
+            </a:pPr>
+            <a:r>
+              <a:rPr lang="en-GB" dirty="0"/>
+              <a:t>The platforms differences at </a:t>
+            </a:r>
+          </a:p>
+          <a:p>
+            <a:pPr algn="ctr"/>
+            <a:r>
+              <a:rPr lang="en-GB" dirty="0"/>
+              <a:t>0.4A (cluster 0 )</a:t>
+            </a:r>
+          </a:p>
+          <a:p>
+            <a:pPr algn="ctr"/>
+            <a:r>
+              <a:rPr lang="en-GB" dirty="0"/>
+              <a:t>0.2A(cluster 1)</a:t>
+            </a:r>
+          </a:p>
+        </p:txBody>
+      </p:sp>
+      <p:sp>
+        <p:nvSpPr>
+          <p:cNvPr id="12" name="TextBox 11">
+            <a:extLst>
+              <a:ext uri="{FF2B5EF4-FFF2-40B4-BE49-F238E27FC236}">
+                <a16:creationId xmlns:a16="http://schemas.microsoft.com/office/drawing/2014/main" id="{E92A5FD4-0BE2-488D-B307-7C401D6F47A8}"/>
+              </a:ext>
+            </a:extLst>
+          </p:cNvPr>
+          <p:cNvSpPr txBox="1"/>
+          <p:nvPr/>
+        </p:nvSpPr>
+        <p:spPr>
+          <a:xfrm>
+            <a:off x="7624035" y="3875666"/>
+            <a:ext cx="4397277" cy="646331"/>
+          </a:xfrm>
+          <a:prstGeom prst="rect">
+            <a:avLst/>
+          </a:prstGeom>
+          <a:noFill/>
+        </p:spPr>
+        <p:txBody>
+          <a:bodyPr wrap="square" rtlCol="0">
+            <a:spAutoFit/>
+          </a:bodyPr>
+          <a:lstStyle/>
+          <a:p>
+            <a:pPr algn="ctr"/>
+            <a:r>
+              <a:rPr lang="en-GB" dirty="0"/>
+              <a:t>cluster 2 seems have constant usage at 0.2A</a:t>
+            </a:r>
+          </a:p>
+          <a:p>
+            <a:pPr algn="ctr"/>
+            <a:endParaRPr lang="en-GB" dirty="0"/>
+          </a:p>
+        </p:txBody>
+      </p:sp>
+      <p:sp>
+        <p:nvSpPr>
+          <p:cNvPr id="13" name="TextBox 12">
+            <a:extLst>
+              <a:ext uri="{FF2B5EF4-FFF2-40B4-BE49-F238E27FC236}">
+                <a16:creationId xmlns:a16="http://schemas.microsoft.com/office/drawing/2014/main" id="{FE265653-C77E-4C8C-BCAC-21B24B5B622E}"/>
+              </a:ext>
+            </a:extLst>
+          </p:cNvPr>
+          <p:cNvSpPr txBox="1"/>
+          <p:nvPr/>
+        </p:nvSpPr>
+        <p:spPr>
+          <a:xfrm>
+            <a:off x="8186654" y="4669971"/>
+            <a:ext cx="3277362" cy="923330"/>
+          </a:xfrm>
+          <a:prstGeom prst="rect">
+            <a:avLst/>
+          </a:prstGeom>
+          <a:noFill/>
+        </p:spPr>
+        <p:txBody>
+          <a:bodyPr wrap="square" rtlCol="0">
+            <a:spAutoFit/>
+          </a:bodyPr>
+          <a:lstStyle/>
+          <a:p>
+            <a:r>
+              <a:rPr lang="en-GB" dirty="0">
+                <a:solidFill>
+                  <a:srgbClr val="FF0000"/>
+                </a:solidFill>
+              </a:rPr>
+              <a:t>Does the differences related to different energy-consumption </a:t>
+            </a:r>
+            <a:r>
+              <a:rPr lang="en-GB" dirty="0" err="1">
+                <a:solidFill>
+                  <a:srgbClr val="FF0000"/>
+                </a:solidFill>
+              </a:rPr>
+              <a:t>equipments</a:t>
+            </a:r>
+            <a:r>
+              <a:rPr lang="en-GB" dirty="0">
+                <a:solidFill>
+                  <a:srgbClr val="FF0000"/>
+                </a:solidFill>
+              </a:rPr>
+              <a:t> ?</a:t>
             </a:r>
           </a:p>
         </p:txBody>
@@ -3044,7 +3213,7 @@
     </p:spTree>
     <p:extLst>
       <p:ext uri="{BB962C8B-B14F-4D97-AF65-F5344CB8AC3E}">
-        <p14:creationId xmlns:p14="http://schemas.microsoft.com/office/powerpoint/2010/main" val="840843310"/>
+        <p14:creationId xmlns:p14="http://schemas.microsoft.com/office/powerpoint/2010/main" val="1328014119"/>
       </p:ext>
     </p:extLst>
   </p:cSld>
@@ -3076,7 +3245,7 @@
           <p:cNvPr id="4" name="Slide Number Placeholder 3">
             <a:extLst>
               <a:ext uri="{FF2B5EF4-FFF2-40B4-BE49-F238E27FC236}">
-                <a16:creationId xmlns:a16="http://schemas.microsoft.com/office/drawing/2014/main" id="{F0E02D06-6143-443E-BF3D-77DC40900BEE}"/>
+                <a16:creationId xmlns:a16="http://schemas.microsoft.com/office/drawing/2014/main" id="{CFBFDB31-5664-43AA-8B1D-27A457ED212B}"/>
               </a:ext>
             </a:extLst>
           </p:cNvPr>
@@ -3105,7 +3274,7 @@
           <p:cNvPr id="5" name="TextBox 4">
             <a:extLst>
               <a:ext uri="{FF2B5EF4-FFF2-40B4-BE49-F238E27FC236}">
-                <a16:creationId xmlns:a16="http://schemas.microsoft.com/office/drawing/2014/main" id="{86A7A675-853A-45A6-A810-DA3AE83409C9}"/>
+                <a16:creationId xmlns:a16="http://schemas.microsoft.com/office/drawing/2014/main" id="{74745BFC-3B3D-4796-B8F8-686B6526F551}"/>
               </a:ext>
             </a:extLst>
           </p:cNvPr>
@@ -3130,17 +3299,33 @@
           <a:p>
             <a:r>
               <a:rPr lang="en-GB" dirty="0"/>
-              <a:t>3.1 Visualization by t-SNE (one week’s data 4-15 2021 to 4-22 2021)</a:t>
+              <a:t>2.2.1 Try divide cells based on outer usage 2 (by ‘</a:t>
+            </a:r>
+            <a:r>
+              <a:rPr lang="en-GB" dirty="0" err="1"/>
+              <a:t>current_out</a:t>
+            </a:r>
+            <a:r>
+              <a:rPr lang="en-GB" dirty="0"/>
+              <a:t>’ – ‘</a:t>
+            </a:r>
+            <a:r>
+              <a:rPr lang="en-GB" dirty="0" err="1"/>
+              <a:t>usb_current</a:t>
+            </a:r>
+            <a:r>
+              <a:rPr lang="en-GB" dirty="0"/>
+              <a:t>’)</a:t>
             </a:r>
           </a:p>
         </p:txBody>
       </p:sp>
       <p:pic>
         <p:nvPicPr>
-          <p:cNvPr id="13" name="Picture 12" descr="Chart, scatter chart&#10;&#10;Description automatically generated">
-            <a:extLst>
-              <a:ext uri="{FF2B5EF4-FFF2-40B4-BE49-F238E27FC236}">
-                <a16:creationId xmlns:a16="http://schemas.microsoft.com/office/drawing/2014/main" id="{D31BF7F5-4584-4B86-9603-F0B57EC6B723}"/>
+          <p:cNvPr id="7" name="Picture 6" descr="Diagram&#10;&#10;Description automatically generated">
+            <a:extLst>
+              <a:ext uri="{FF2B5EF4-FFF2-40B4-BE49-F238E27FC236}">
+                <a16:creationId xmlns:a16="http://schemas.microsoft.com/office/drawing/2014/main" id="{23D3F858-126A-422E-84C1-29C5C768D3D8}"/>
               </a:ext>
             </a:extLst>
           </p:cNvPr>
@@ -3163,90 +3348,54 @@
         </p:blipFill>
         <p:spPr>
           <a:xfrm>
-            <a:off x="119441" y="1306285"/>
-            <a:ext cx="3732960" cy="3739244"/>
+            <a:off x="958110" y="884820"/>
+            <a:ext cx="6717415" cy="5213902"/>
           </a:xfrm>
           <a:prstGeom prst="rect">
             <a:avLst/>
           </a:prstGeom>
         </p:spPr>
       </p:pic>
-      <p:pic>
-        <p:nvPicPr>
-          <p:cNvPr id="15" name="Picture 14" descr="Chart, scatter chart&#10;&#10;Description automatically generated">
-            <a:extLst>
-              <a:ext uri="{FF2B5EF4-FFF2-40B4-BE49-F238E27FC236}">
-                <a16:creationId xmlns:a16="http://schemas.microsoft.com/office/drawing/2014/main" id="{493E7103-5095-414A-ADC4-0915A8802366}"/>
-              </a:ext>
-            </a:extLst>
-          </p:cNvPr>
-          <p:cNvPicPr>
-            <a:picLocks noChangeAspect="1"/>
-          </p:cNvPicPr>
+      <p:sp>
+        <p:nvSpPr>
+          <p:cNvPr id="8" name="TextBox 7">
+            <a:extLst>
+              <a:ext uri="{FF2B5EF4-FFF2-40B4-BE49-F238E27FC236}">
+                <a16:creationId xmlns:a16="http://schemas.microsoft.com/office/drawing/2014/main" id="{64C60CF7-BD50-4D5C-B7B1-DFE47C1D1E2B}"/>
+              </a:ext>
+            </a:extLst>
+          </p:cNvPr>
+          <p:cNvSpPr txBox="1"/>
           <p:nvPr/>
-        </p:nvPicPr>
-        <p:blipFill>
-          <a:blip r:embed="rId3">
-            <a:extLst>
-              <a:ext uri="{28A0092B-C50C-407E-A947-70E740481C1C}">
-                <a14:useLocalDpi xmlns:a14="http://schemas.microsoft.com/office/drawing/2010/main" val="0"/>
-              </a:ext>
-            </a:extLst>
-          </a:blip>
-          <a:stretch>
-            <a:fillRect/>
-          </a:stretch>
-        </p:blipFill>
-        <p:spPr>
-          <a:xfrm>
-            <a:off x="4100092" y="1281792"/>
-            <a:ext cx="3732960" cy="3739244"/>
+        </p:nvSpPr>
+        <p:spPr>
+          <a:xfrm>
+            <a:off x="7968343" y="2547256"/>
+            <a:ext cx="3575957" cy="646331"/>
           </a:xfrm>
           <a:prstGeom prst="rect">
             <a:avLst/>
           </a:prstGeom>
-        </p:spPr>
-      </p:pic>
-      <p:pic>
-        <p:nvPicPr>
-          <p:cNvPr id="17" name="Picture 16" descr="Chart, scatter chart&#10;&#10;Description automatically generated">
-            <a:extLst>
-              <a:ext uri="{FF2B5EF4-FFF2-40B4-BE49-F238E27FC236}">
-                <a16:creationId xmlns:a16="http://schemas.microsoft.com/office/drawing/2014/main" id="{788224C4-FB1B-4233-862B-AECBF292A52B}"/>
-              </a:ext>
-            </a:extLst>
-          </p:cNvPr>
-          <p:cNvPicPr>
-            <a:picLocks noChangeAspect="1"/>
-          </p:cNvPicPr>
-          <p:nvPr/>
-        </p:nvPicPr>
-        <p:blipFill>
-          <a:blip r:embed="rId4">
-            <a:extLst>
-              <a:ext uri="{28A0092B-C50C-407E-A947-70E740481C1C}">
-                <a14:useLocalDpi xmlns:a14="http://schemas.microsoft.com/office/drawing/2010/main" val="0"/>
-              </a:ext>
-            </a:extLst>
-          </a:blip>
-          <a:stretch>
-            <a:fillRect/>
-          </a:stretch>
-        </p:blipFill>
-        <p:spPr>
-          <a:xfrm>
-            <a:off x="8080744" y="1306285"/>
-            <a:ext cx="3732960" cy="3739244"/>
-          </a:xfrm>
-          <a:prstGeom prst="rect">
-            <a:avLst/>
-          </a:prstGeom>
-        </p:spPr>
-      </p:pic>
+          <a:noFill/>
+        </p:spPr>
+        <p:txBody>
+          <a:bodyPr wrap="square" rtlCol="0">
+            <a:spAutoFit/>
+          </a:bodyPr>
+          <a:lstStyle/>
+          <a:p>
+            <a:pPr algn="ctr"/>
+            <a:r>
+              <a:rPr lang="en-GB" dirty="0"/>
+              <a:t>Also the mentioned usage differences within one day</a:t>
+            </a:r>
+          </a:p>
+        </p:txBody>
+      </p:sp>
     </p:spTree>
     <p:extLst>
       <p:ext uri="{BB962C8B-B14F-4D97-AF65-F5344CB8AC3E}">
-        <p14:creationId xmlns:p14="http://schemas.microsoft.com/office/powerpoint/2010/main" val="593824393"/>
+        <p14:creationId xmlns:p14="http://schemas.microsoft.com/office/powerpoint/2010/main" val="840843310"/>
       </p:ext>
     </p:extLst>
   </p:cSld>
@@ -3278,7 +3427,7 @@
           <p:cNvPr id="4" name="Slide Number Placeholder 3">
             <a:extLst>
               <a:ext uri="{FF2B5EF4-FFF2-40B4-BE49-F238E27FC236}">
-                <a16:creationId xmlns:a16="http://schemas.microsoft.com/office/drawing/2014/main" id="{5F10CE1D-4312-4864-972B-3DCD1000B480}"/>
+                <a16:creationId xmlns:a16="http://schemas.microsoft.com/office/drawing/2014/main" id="{F0E02D06-6143-443E-BF3D-77DC40900BEE}"/>
               </a:ext>
             </a:extLst>
           </p:cNvPr>
@@ -3297,6 +3446,208 @@
             <a:fld id="{6107575F-A13F-2D4E-A3BF-51E71354130A}" type="slidenum">
               <a:rPr lang="en-US" smtClean="0"/>
               <a:t>8</a:t>
+            </a:fld>
+            <a:endParaRPr lang="en-US"/>
+          </a:p>
+        </p:txBody>
+      </p:sp>
+      <p:sp>
+        <p:nvSpPr>
+          <p:cNvPr id="5" name="TextBox 4">
+            <a:extLst>
+              <a:ext uri="{FF2B5EF4-FFF2-40B4-BE49-F238E27FC236}">
+                <a16:creationId xmlns:a16="http://schemas.microsoft.com/office/drawing/2014/main" id="{86A7A675-853A-45A6-A810-DA3AE83409C9}"/>
+              </a:ext>
+            </a:extLst>
+          </p:cNvPr>
+          <p:cNvSpPr txBox="1"/>
+          <p:nvPr/>
+        </p:nvSpPr>
+        <p:spPr>
+          <a:xfrm>
+            <a:off x="552893" y="223283"/>
+            <a:ext cx="7527851" cy="369332"/>
+          </a:xfrm>
+          <a:prstGeom prst="rect">
+            <a:avLst/>
+          </a:prstGeom>
+          <a:noFill/>
+        </p:spPr>
+        <p:txBody>
+          <a:bodyPr wrap="square" rtlCol="0">
+            <a:spAutoFit/>
+          </a:bodyPr>
+          <a:lstStyle/>
+          <a:p>
+            <a:r>
+              <a:rPr lang="en-GB" dirty="0"/>
+              <a:t>3.1 Visualization by t-SNE (one week’s data 4-15 2021 to 4-22 2021)</a:t>
+            </a:r>
+          </a:p>
+        </p:txBody>
+      </p:sp>
+      <p:pic>
+        <p:nvPicPr>
+          <p:cNvPr id="13" name="Picture 12" descr="Chart, scatter chart&#10;&#10;Description automatically generated">
+            <a:extLst>
+              <a:ext uri="{FF2B5EF4-FFF2-40B4-BE49-F238E27FC236}">
+                <a16:creationId xmlns:a16="http://schemas.microsoft.com/office/drawing/2014/main" id="{D31BF7F5-4584-4B86-9603-F0B57EC6B723}"/>
+              </a:ext>
+            </a:extLst>
+          </p:cNvPr>
+          <p:cNvPicPr>
+            <a:picLocks noChangeAspect="1"/>
+          </p:cNvPicPr>
+          <p:nvPr/>
+        </p:nvPicPr>
+        <p:blipFill>
+          <a:blip r:embed="rId2">
+            <a:extLst>
+              <a:ext uri="{28A0092B-C50C-407E-A947-70E740481C1C}">
+                <a14:useLocalDpi xmlns:a14="http://schemas.microsoft.com/office/drawing/2010/main" val="0"/>
+              </a:ext>
+            </a:extLst>
+          </a:blip>
+          <a:stretch>
+            <a:fillRect/>
+          </a:stretch>
+        </p:blipFill>
+        <p:spPr>
+          <a:xfrm>
+            <a:off x="119441" y="1306285"/>
+            <a:ext cx="3732960" cy="3739244"/>
+          </a:xfrm>
+          <a:prstGeom prst="rect">
+            <a:avLst/>
+          </a:prstGeom>
+        </p:spPr>
+      </p:pic>
+      <p:pic>
+        <p:nvPicPr>
+          <p:cNvPr id="15" name="Picture 14" descr="Chart, scatter chart&#10;&#10;Description automatically generated">
+            <a:extLst>
+              <a:ext uri="{FF2B5EF4-FFF2-40B4-BE49-F238E27FC236}">
+                <a16:creationId xmlns:a16="http://schemas.microsoft.com/office/drawing/2014/main" id="{493E7103-5095-414A-ADC4-0915A8802366}"/>
+              </a:ext>
+            </a:extLst>
+          </p:cNvPr>
+          <p:cNvPicPr>
+            <a:picLocks noChangeAspect="1"/>
+          </p:cNvPicPr>
+          <p:nvPr/>
+        </p:nvPicPr>
+        <p:blipFill>
+          <a:blip r:embed="rId3">
+            <a:extLst>
+              <a:ext uri="{28A0092B-C50C-407E-A947-70E740481C1C}">
+                <a14:useLocalDpi xmlns:a14="http://schemas.microsoft.com/office/drawing/2010/main" val="0"/>
+              </a:ext>
+            </a:extLst>
+          </a:blip>
+          <a:stretch>
+            <a:fillRect/>
+          </a:stretch>
+        </p:blipFill>
+        <p:spPr>
+          <a:xfrm>
+            <a:off x="4100092" y="1281792"/>
+            <a:ext cx="3732960" cy="3739244"/>
+          </a:xfrm>
+          <a:prstGeom prst="rect">
+            <a:avLst/>
+          </a:prstGeom>
+        </p:spPr>
+      </p:pic>
+      <p:pic>
+        <p:nvPicPr>
+          <p:cNvPr id="17" name="Picture 16" descr="Chart, scatter chart&#10;&#10;Description automatically generated">
+            <a:extLst>
+              <a:ext uri="{FF2B5EF4-FFF2-40B4-BE49-F238E27FC236}">
+                <a16:creationId xmlns:a16="http://schemas.microsoft.com/office/drawing/2014/main" id="{788224C4-FB1B-4233-862B-AECBF292A52B}"/>
+              </a:ext>
+            </a:extLst>
+          </p:cNvPr>
+          <p:cNvPicPr>
+            <a:picLocks noChangeAspect="1"/>
+          </p:cNvPicPr>
+          <p:nvPr/>
+        </p:nvPicPr>
+        <p:blipFill>
+          <a:blip r:embed="rId4">
+            <a:extLst>
+              <a:ext uri="{28A0092B-C50C-407E-A947-70E740481C1C}">
+                <a14:useLocalDpi xmlns:a14="http://schemas.microsoft.com/office/drawing/2010/main" val="0"/>
+              </a:ext>
+            </a:extLst>
+          </a:blip>
+          <a:stretch>
+            <a:fillRect/>
+          </a:stretch>
+        </p:blipFill>
+        <p:spPr>
+          <a:xfrm>
+            <a:off x="8080744" y="1306285"/>
+            <a:ext cx="3732960" cy="3739244"/>
+          </a:xfrm>
+          <a:prstGeom prst="rect">
+            <a:avLst/>
+          </a:prstGeom>
+        </p:spPr>
+      </p:pic>
+    </p:spTree>
+    <p:extLst>
+      <p:ext uri="{BB962C8B-B14F-4D97-AF65-F5344CB8AC3E}">
+        <p14:creationId xmlns:p14="http://schemas.microsoft.com/office/powerpoint/2010/main" val="593824393"/>
+      </p:ext>
+    </p:extLst>
+  </p:cSld>
+  <p:clrMapOvr>
+    <a:masterClrMapping/>
+  </p:clrMapOvr>
+</p:sld>
+</file>
+
+<file path=ppt/slides/slide9.xml><?xml version="1.0" encoding="utf-8"?>
+<p:sld xmlns:a="http://schemas.openxmlformats.org/drawingml/2006/main" xmlns:r="http://schemas.openxmlformats.org/officeDocument/2006/relationships" xmlns:p="http://schemas.openxmlformats.org/presentationml/2006/main">
+  <p:cSld>
+    <p:spTree>
+      <p:nvGrpSpPr>
+        <p:cNvPr id="1" name=""/>
+        <p:cNvGrpSpPr/>
+        <p:nvPr/>
+      </p:nvGrpSpPr>
+      <p:grpSpPr>
+        <a:xfrm>
+          <a:off x="0" y="0"/>
+          <a:ext cx="0" cy="0"/>
+          <a:chOff x="0" y="0"/>
+          <a:chExt cx="0" cy="0"/>
+        </a:xfrm>
+      </p:grpSpPr>
+      <p:sp>
+        <p:nvSpPr>
+          <p:cNvPr id="4" name="Slide Number Placeholder 3">
+            <a:extLst>
+              <a:ext uri="{FF2B5EF4-FFF2-40B4-BE49-F238E27FC236}">
+                <a16:creationId xmlns:a16="http://schemas.microsoft.com/office/drawing/2014/main" id="{5F10CE1D-4312-4864-972B-3DCD1000B480}"/>
+              </a:ext>
+            </a:extLst>
+          </p:cNvPr>
+          <p:cNvSpPr>
+            <a:spLocks noGrp="1"/>
+          </p:cNvSpPr>
+          <p:nvPr>
+            <p:ph type="sldNum" sz="quarter" idx="12"/>
+          </p:nvPr>
+        </p:nvSpPr>
+        <p:spPr/>
+        <p:txBody>
+          <a:bodyPr/>
+          <a:lstStyle/>
+          <a:p>
+            <a:fld id="{6107575F-A13F-2D4E-A3BF-51E71354130A}" type="slidenum">
+              <a:rPr lang="en-US" smtClean="0"/>
+              <a:t>9</a:t>
             </a:fld>
             <a:endParaRPr lang="en-US"/>
           </a:p>

</xml_diff>